<commit_message>
deleted an extra slide
</commit_message>
<xml_diff>
--- a/Appendix E-Approach Criteria Evidence/criteria A-1 GSA 18F kick off.pptx
+++ b/Appendix E-Approach Criteria Evidence/criteria A-1 GSA 18F kick off.pptx
@@ -5,10 +5,10 @@
     <p:sldMasterId id="2147483648" r:id="rId1"/>
   </p:sldMasterIdLst>
   <p:notesMasterIdLst>
-    <p:notesMasterId r:id="rId10"/>
+    <p:notesMasterId r:id="rId9"/>
   </p:notesMasterIdLst>
   <p:handoutMasterIdLst>
-    <p:handoutMasterId r:id="rId11"/>
+    <p:handoutMasterId r:id="rId10"/>
   </p:handoutMasterIdLst>
   <p:sldIdLst>
     <p:sldId id="298" r:id="rId2"/>
@@ -18,7 +18,6 @@
     <p:sldId id="333" r:id="rId6"/>
     <p:sldId id="334" r:id="rId7"/>
     <p:sldId id="335" r:id="rId8"/>
-    <p:sldId id="336" r:id="rId9"/>
   </p:sldIdLst>
   <p:sldSz cx="9144000" cy="6858000" type="screen4x3"/>
   <p:notesSz cx="7010400" cy="9296400"/>
@@ -6142,123 +6141,6 @@
           </p:nvPr>
         </p:nvSpPr>
         <p:spPr/>
-        <p:txBody>
-          <a:bodyPr/>
-          <a:lstStyle/>
-          <a:p>
-            <a:pPr>
-              <a:defRPr/>
-            </a:pPr>
-            <a:r>
-              <a:rPr lang="en-US" dirty="0"/>
-              <a:t>Multiple BPAs for Agile Delivery Services (ADS I) </a:t>
-            </a:r>
-          </a:p>
-        </p:txBody>
-      </p:sp>
-    </p:spTree>
-  </p:cSld>
-  <p:clrMapOvr>
-    <a:masterClrMapping/>
-  </p:clrMapOvr>
-  <p:transition xmlns:p14="http://schemas.microsoft.com/office/powerpoint/2010/main" advClick="0"/>
-</p:sld>
-</file>
-
-<file path=ppt/slides/slide8.xml><?xml version="1.0" encoding="utf-8"?>
-<p:sld xmlns:a="http://schemas.openxmlformats.org/drawingml/2006/main" xmlns:r="http://schemas.openxmlformats.org/officeDocument/2006/relationships" xmlns:p="http://schemas.openxmlformats.org/presentationml/2006/main">
-  <p:cSld>
-    <p:spTree>
-      <p:nvGrpSpPr>
-        <p:cNvPr id="1" name=""/>
-        <p:cNvGrpSpPr/>
-        <p:nvPr/>
-      </p:nvGrpSpPr>
-      <p:grpSpPr>
-        <a:xfrm>
-          <a:off x="0" y="0"/>
-          <a:ext cx="0" cy="0"/>
-          <a:chOff x="0" y="0"/>
-          <a:chExt cx="0" cy="0"/>
-        </a:xfrm>
-      </p:grpSpPr>
-      <p:sp>
-        <p:nvSpPr>
-          <p:cNvPr id="13314" name="Content Placeholder 1"/>
-          <p:cNvSpPr>
-            <a:spLocks noGrp="1"/>
-          </p:cNvSpPr>
-          <p:nvPr>
-            <p:ph idx="1"/>
-          </p:nvPr>
-        </p:nvSpPr>
-        <p:spPr>
-          <a:xfrm>
-            <a:off x="457200" y="1600200"/>
-            <a:ext cx="8229600" cy="4525963"/>
-          </a:xfrm>
-        </p:spPr>
-        <p:txBody>
-          <a:bodyPr/>
-          <a:lstStyle/>
-          <a:p>
-            <a:pPr>
-              <a:buFont typeface="Wingdings" charset="0"/>
-              <a:buChar char="§"/>
-            </a:pPr>
-            <a:r>
-              <a:rPr lang="en-US">
-                <a:latin typeface="Arial" charset="0"/>
-                <a:ea typeface="ＭＳ Ｐゴシック" charset="0"/>
-                <a:cs typeface="Arial" charset="0"/>
-              </a:rPr>
-              <a:t>Follow the US Digital Services Playbook</a:t>
-            </a:r>
-          </a:p>
-        </p:txBody>
-      </p:sp>
-      <p:sp>
-        <p:nvSpPr>
-          <p:cNvPr id="13315" name="Title 2"/>
-          <p:cNvSpPr>
-            <a:spLocks noGrp="1"/>
-          </p:cNvSpPr>
-          <p:nvPr>
-            <p:ph type="title"/>
-          </p:nvPr>
-        </p:nvSpPr>
-        <p:spPr/>
-        <p:txBody>
-          <a:bodyPr/>
-          <a:lstStyle/>
-          <a:p>
-            <a:r>
-              <a:rPr lang="en-US">
-                <a:latin typeface="Arial Black" charset="0"/>
-                <a:ea typeface="ＭＳ Ｐゴシック" charset="0"/>
-                <a:cs typeface="Arial" charset="0"/>
-              </a:rPr>
-              <a:t>18F Agile Delivery Services</a:t>
-            </a:r>
-          </a:p>
-        </p:txBody>
-      </p:sp>
-      <p:sp>
-        <p:nvSpPr>
-          <p:cNvPr id="4" name="Text Placeholder 3"/>
-          <p:cNvSpPr>
-            <a:spLocks noGrp="1"/>
-          </p:cNvSpPr>
-          <p:nvPr>
-            <p:ph type="body" idx="17"/>
-          </p:nvPr>
-        </p:nvSpPr>
-        <p:spPr>
-          <a:xfrm>
-            <a:off x="457200" y="838200"/>
-            <a:ext cx="8229600" cy="609600"/>
-          </a:xfrm>
-        </p:spPr>
         <p:txBody>
           <a:bodyPr/>
           <a:lstStyle/>

</xml_diff>